<commit_message>
ppt and modified logs
</commit_message>
<xml_diff>
--- a/Hritik Londe Capstone Project.pptx
+++ b/Hritik Londe Capstone Project.pptx
@@ -276,7 +276,7 @@
           <a:p>
             <a:fld id="{6D3052E0-193B-4471-BAD0-B156ECCE0645}" type="datetimeFigureOut">
               <a:rPr lang="en-IN" smtClean="0"/>
-              <a:t>30-04-2023</a:t>
+              <a:t>02-05-2023</a:t>
             </a:fld>
             <a:endParaRPr lang="en-IN"/>
           </a:p>
@@ -476,7 +476,7 @@
           <a:p>
             <a:fld id="{6D3052E0-193B-4471-BAD0-B156ECCE0645}" type="datetimeFigureOut">
               <a:rPr lang="en-IN" smtClean="0"/>
-              <a:t>30-04-2023</a:t>
+              <a:t>02-05-2023</a:t>
             </a:fld>
             <a:endParaRPr lang="en-IN"/>
           </a:p>
@@ -686,7 +686,7 @@
           <a:p>
             <a:fld id="{6D3052E0-193B-4471-BAD0-B156ECCE0645}" type="datetimeFigureOut">
               <a:rPr lang="en-IN" smtClean="0"/>
-              <a:t>30-04-2023</a:t>
+              <a:t>02-05-2023</a:t>
             </a:fld>
             <a:endParaRPr lang="en-IN"/>
           </a:p>
@@ -886,7 +886,7 @@
           <a:p>
             <a:fld id="{6D3052E0-193B-4471-BAD0-B156ECCE0645}" type="datetimeFigureOut">
               <a:rPr lang="en-IN" smtClean="0"/>
-              <a:t>30-04-2023</a:t>
+              <a:t>02-05-2023</a:t>
             </a:fld>
             <a:endParaRPr lang="en-IN"/>
           </a:p>
@@ -1162,7 +1162,7 @@
           <a:p>
             <a:fld id="{6D3052E0-193B-4471-BAD0-B156ECCE0645}" type="datetimeFigureOut">
               <a:rPr lang="en-IN" smtClean="0"/>
-              <a:t>30-04-2023</a:t>
+              <a:t>02-05-2023</a:t>
             </a:fld>
             <a:endParaRPr lang="en-IN"/>
           </a:p>
@@ -1430,7 +1430,7 @@
           <a:p>
             <a:fld id="{6D3052E0-193B-4471-BAD0-B156ECCE0645}" type="datetimeFigureOut">
               <a:rPr lang="en-IN" smtClean="0"/>
-              <a:t>30-04-2023</a:t>
+              <a:t>02-05-2023</a:t>
             </a:fld>
             <a:endParaRPr lang="en-IN"/>
           </a:p>
@@ -1845,7 +1845,7 @@
           <a:p>
             <a:fld id="{6D3052E0-193B-4471-BAD0-B156ECCE0645}" type="datetimeFigureOut">
               <a:rPr lang="en-IN" smtClean="0"/>
-              <a:t>30-04-2023</a:t>
+              <a:t>02-05-2023</a:t>
             </a:fld>
             <a:endParaRPr lang="en-IN"/>
           </a:p>
@@ -1987,7 +1987,7 @@
           <a:p>
             <a:fld id="{6D3052E0-193B-4471-BAD0-B156ECCE0645}" type="datetimeFigureOut">
               <a:rPr lang="en-IN" smtClean="0"/>
-              <a:t>30-04-2023</a:t>
+              <a:t>02-05-2023</a:t>
             </a:fld>
             <a:endParaRPr lang="en-IN"/>
           </a:p>
@@ -2100,7 +2100,7 @@
           <a:p>
             <a:fld id="{6D3052E0-193B-4471-BAD0-B156ECCE0645}" type="datetimeFigureOut">
               <a:rPr lang="en-IN" smtClean="0"/>
-              <a:t>30-04-2023</a:t>
+              <a:t>02-05-2023</a:t>
             </a:fld>
             <a:endParaRPr lang="en-IN"/>
           </a:p>
@@ -2413,7 +2413,7 @@
           <a:p>
             <a:fld id="{6D3052E0-193B-4471-BAD0-B156ECCE0645}" type="datetimeFigureOut">
               <a:rPr lang="en-IN" smtClean="0"/>
-              <a:t>30-04-2023</a:t>
+              <a:t>02-05-2023</a:t>
             </a:fld>
             <a:endParaRPr lang="en-IN"/>
           </a:p>
@@ -2706,7 +2706,7 @@
           <a:p>
             <a:fld id="{6D3052E0-193B-4471-BAD0-B156ECCE0645}" type="datetimeFigureOut">
               <a:rPr lang="en-IN" smtClean="0"/>
-              <a:t>30-04-2023</a:t>
+              <a:t>02-05-2023</a:t>
             </a:fld>
             <a:endParaRPr lang="en-IN"/>
           </a:p>
@@ -2949,7 +2949,7 @@
           <a:p>
             <a:fld id="{6D3052E0-193B-4471-BAD0-B156ECCE0645}" type="datetimeFigureOut">
               <a:rPr lang="en-IN" smtClean="0"/>
-              <a:t>30-04-2023</a:t>
+              <a:t>02-05-2023</a:t>
             </a:fld>
             <a:endParaRPr lang="en-IN"/>
           </a:p>
@@ -6188,7 +6188,7 @@
                 <a:latin typeface="Times New Roman" panose="02020603050405020304" pitchFamily="18" charset="0"/>
                 <a:cs typeface="Times New Roman" panose="02020603050405020304" pitchFamily="18" charset="0"/>
               </a:rPr>
-              <a:t>LMS Id : </a:t>
+              <a:t>LMS Id : londhehritik1408@gmail.com</a:t>
             </a:r>
             <a:endParaRPr lang="en-US" sz="1900" dirty="0">
               <a:effectLst/>
@@ -6238,7 +6238,22 @@
                 <a:latin typeface="Times New Roman" panose="02020603050405020304" pitchFamily="18" charset="0"/>
                 <a:cs typeface="Times New Roman" panose="02020603050405020304" pitchFamily="18" charset="0"/>
               </a:rPr>
-              <a:t>Date: 27-April-2023</a:t>
+              <a:t>Date: </a:t>
+            </a:r>
+            <a:r>
+              <a:rPr lang="en-US" sz="1900" b="1" dirty="0">
+                <a:latin typeface="Times New Roman" panose="02020603050405020304" pitchFamily="18" charset="0"/>
+                <a:cs typeface="Times New Roman" panose="02020603050405020304" pitchFamily="18" charset="0"/>
+              </a:rPr>
+              <a:t>02-May-</a:t>
+            </a:r>
+            <a:r>
+              <a:rPr lang="en-US" sz="1900" b="1" dirty="0">
+                <a:effectLst/>
+                <a:latin typeface="Times New Roman" panose="02020603050405020304" pitchFamily="18" charset="0"/>
+                <a:cs typeface="Times New Roman" panose="02020603050405020304" pitchFamily="18" charset="0"/>
+              </a:rPr>
+              <a:t>2023</a:t>
             </a:r>
             <a:endParaRPr lang="en-US" sz="1900" dirty="0">
               <a:effectLst/>
@@ -24948,10 +24963,10 @@
       </p:sp>
       <p:pic>
         <p:nvPicPr>
-          <p:cNvPr id="3" name="Picture 2" descr="Diagram&#10;&#10;Description automatically generated">
+          <p:cNvPr id="4" name="Picture 3">
             <a:extLst>
               <a:ext uri="{FF2B5EF4-FFF2-40B4-BE49-F238E27FC236}">
-                <a16:creationId xmlns:a16="http://schemas.microsoft.com/office/drawing/2014/main" id="{59C2F63B-C048-ECBD-4FB6-3745B7C46E6D}"/>
+                <a16:creationId xmlns:a16="http://schemas.microsoft.com/office/drawing/2014/main" id="{21BE141A-CE10-5531-4347-D2D44DDBADD8}"/>
               </a:ext>
             </a:extLst>
           </p:cNvPr>
@@ -24961,21 +24976,15 @@
           <p:nvPr/>
         </p:nvPicPr>
         <p:blipFill>
-          <a:blip r:embed="rId3">
-            <a:extLst>
-              <a:ext uri="{28A0092B-C50C-407E-A947-70E740481C1C}">
-                <a14:useLocalDpi xmlns:a14="http://schemas.microsoft.com/office/drawing/2010/main" val="0"/>
-              </a:ext>
-            </a:extLst>
-          </a:blip>
+          <a:blip r:embed="rId3"/>
           <a:stretch>
             <a:fillRect/>
           </a:stretch>
         </p:blipFill>
         <p:spPr>
           <a:xfrm>
-            <a:off x="1129004" y="1442291"/>
-            <a:ext cx="9900622" cy="4207766"/>
+            <a:off x="2679978" y="1572781"/>
+            <a:ext cx="8096250" cy="4657725"/>
           </a:xfrm>
           <a:prstGeom prst="rect">
             <a:avLst/>

</xml_diff>